<commit_message>
update the presentation with summaries
</commit_message>
<xml_diff>
--- a/Docs/Navigation With Shell Step 1.pptx
+++ b/Docs/Navigation With Shell Step 1.pptx
@@ -5,7 +5,7 @@
     <p:sldMasterId id="2147483715" r:id="rId4"/>
   </p:sldMasterIdLst>
   <p:notesMasterIdLst>
-    <p:notesMasterId r:id="rId17"/>
+    <p:notesMasterId r:id="rId19"/>
   </p:notesMasterIdLst>
   <p:sldIdLst>
     <p:sldId id="1955" r:id="rId5"/>
@@ -18,8 +18,10 @@
     <p:sldId id="1988" r:id="rId12"/>
     <p:sldId id="1978" r:id="rId13"/>
     <p:sldId id="1990" r:id="rId14"/>
-    <p:sldId id="1991" r:id="rId15"/>
-    <p:sldId id="1992" r:id="rId16"/>
+    <p:sldId id="1993" r:id="rId15"/>
+    <p:sldId id="1994" r:id="rId16"/>
+    <p:sldId id="1995" r:id="rId17"/>
+    <p:sldId id="1992" r:id="rId18"/>
   </p:sldIdLst>
   <p:sldSz cx="12192000" cy="6858000"/>
   <p:notesSz cx="6858000" cy="9144000"/>
@@ -133,7 +135,9 @@
             <p14:sldId id="1988"/>
             <p14:sldId id="1978"/>
             <p14:sldId id="1990"/>
-            <p14:sldId id="1991"/>
+            <p14:sldId id="1993"/>
+            <p14:sldId id="1994"/>
+            <p14:sldId id="1995"/>
             <p14:sldId id="1992"/>
           </p14:sldIdLst>
         </p14:section>
@@ -170,8 +174,8 @@
 <pc:chgInfo xmlns:a="http://schemas.openxmlformats.org/drawingml/2006/main" xmlns:r="http://schemas.openxmlformats.org/officeDocument/2006/relationships" xmlns:ac="http://schemas.microsoft.com/office/drawing/2013/main/command" xmlns:pc="http://schemas.microsoft.com/office/powerpoint/2013/main/command">
   <pc:docChgLst>
     <pc:chgData name="Ofer Zadikario" userId="f36b4b4543f14e71" providerId="LiveId" clId="{D6944E5A-F80B-4E16-8360-36A7472AE177}"/>
-    <pc:docChg chg="undo custSel addSld delSld modSld modSection">
-      <pc:chgData name="Ofer Zadikario" userId="f36b4b4543f14e71" providerId="LiveId" clId="{D6944E5A-F80B-4E16-8360-36A7472AE177}" dt="2024-02-07T11:29:14.757" v="3969" actId="2696"/>
+    <pc:docChg chg="undo redo custSel addSld delSld modSld modSection">
+      <pc:chgData name="Ofer Zadikario" userId="f36b4b4543f14e71" providerId="LiveId" clId="{D6944E5A-F80B-4E16-8360-36A7472AE177}" dt="2024-02-16T10:29:46.619" v="5386" actId="47"/>
       <pc:docMkLst>
         <pc:docMk/>
       </pc:docMkLst>
@@ -662,8 +666,8 @@
           </ac:picMkLst>
         </pc:picChg>
       </pc:sldChg>
-      <pc:sldChg chg="delSp modSp add mod">
-        <pc:chgData name="Ofer Zadikario" userId="f36b4b4543f14e71" providerId="LiveId" clId="{D6944E5A-F80B-4E16-8360-36A7472AE177}" dt="2024-02-07T11:26:20.427" v="3629" actId="5793"/>
+      <pc:sldChg chg="delSp modSp add del mod">
+        <pc:chgData name="Ofer Zadikario" userId="f36b4b4543f14e71" providerId="LiveId" clId="{D6944E5A-F80B-4E16-8360-36A7472AE177}" dt="2024-02-16T10:29:46.619" v="5386" actId="47"/>
         <pc:sldMkLst>
           <pc:docMk/>
           <pc:sldMk cId="1917545158" sldId="1991"/>
@@ -715,6 +719,163 @@
             <ac:spMk id="3" creationId="{026CA507-4F50-46D6-AA4E-FDF5556502F3}"/>
           </ac:spMkLst>
         </pc:spChg>
+      </pc:sldChg>
+      <pc:sldChg chg="addSp delSp modSp add mod">
+        <pc:chgData name="Ofer Zadikario" userId="f36b4b4543f14e71" providerId="LiveId" clId="{D6944E5A-F80B-4E16-8360-36A7472AE177}" dt="2024-02-16T10:27:10.515" v="5343" actId="1036"/>
+        <pc:sldMkLst>
+          <pc:docMk/>
+          <pc:sldMk cId="3030916205" sldId="1993"/>
+        </pc:sldMkLst>
+        <pc:spChg chg="mod">
+          <ac:chgData name="Ofer Zadikario" userId="f36b4b4543f14e71" providerId="LiveId" clId="{D6944E5A-F80B-4E16-8360-36A7472AE177}" dt="2024-02-16T10:26:59.828" v="5320" actId="404"/>
+          <ac:spMkLst>
+            <pc:docMk/>
+            <pc:sldMk cId="3030916205" sldId="1993"/>
+            <ac:spMk id="2" creationId="{FF93ECBD-2B08-A142-B5A0-4E89DC6EEDCE}"/>
+          </ac:spMkLst>
+        </pc:spChg>
+        <pc:spChg chg="mod">
+          <ac:chgData name="Ofer Zadikario" userId="f36b4b4543f14e71" providerId="LiveId" clId="{D6944E5A-F80B-4E16-8360-36A7472AE177}" dt="2024-02-16T10:27:10.515" v="5343" actId="1036"/>
+          <ac:spMkLst>
+            <pc:docMk/>
+            <pc:sldMk cId="3030916205" sldId="1993"/>
+            <ac:spMk id="3" creationId="{DBA24E19-32DB-ADA5-1CC8-9204A2E0440D}"/>
+          </ac:spMkLst>
+        </pc:spChg>
+        <pc:spChg chg="mod">
+          <ac:chgData name="Ofer Zadikario" userId="f36b4b4543f14e71" providerId="LiveId" clId="{D6944E5A-F80B-4E16-8360-36A7472AE177}" dt="2024-02-16T10:27:10.515" v="5343" actId="1036"/>
+          <ac:spMkLst>
+            <pc:docMk/>
+            <pc:sldMk cId="3030916205" sldId="1993"/>
+            <ac:spMk id="8" creationId="{7C0653E7-86BF-1B6E-04AA-0C82EE304C1F}"/>
+          </ac:spMkLst>
+        </pc:spChg>
+        <pc:picChg chg="add del mod">
+          <ac:chgData name="Ofer Zadikario" userId="f36b4b4543f14e71" providerId="LiveId" clId="{D6944E5A-F80B-4E16-8360-36A7472AE177}" dt="2024-02-16T10:12:42.232" v="4504" actId="478"/>
+          <ac:picMkLst>
+            <pc:docMk/>
+            <pc:sldMk cId="3030916205" sldId="1993"/>
+            <ac:picMk id="5" creationId="{29B764F2-B8D7-85CA-E5C9-5769601D70DF}"/>
+          </ac:picMkLst>
+        </pc:picChg>
+        <pc:picChg chg="add mod">
+          <ac:chgData name="Ofer Zadikario" userId="f36b4b4543f14e71" providerId="LiveId" clId="{D6944E5A-F80B-4E16-8360-36A7472AE177}" dt="2024-02-16T10:27:10.515" v="5343" actId="1036"/>
+          <ac:picMkLst>
+            <pc:docMk/>
+            <pc:sldMk cId="3030916205" sldId="1993"/>
+            <ac:picMk id="7" creationId="{BA999826-E2E5-96BA-B9B8-0715858B2345}"/>
+          </ac:picMkLst>
+        </pc:picChg>
+        <pc:picChg chg="add mod">
+          <ac:chgData name="Ofer Zadikario" userId="f36b4b4543f14e71" providerId="LiveId" clId="{D6944E5A-F80B-4E16-8360-36A7472AE177}" dt="2024-02-16T10:27:10.515" v="5343" actId="1036"/>
+          <ac:picMkLst>
+            <pc:docMk/>
+            <pc:sldMk cId="3030916205" sldId="1993"/>
+            <ac:picMk id="10" creationId="{C5429A9B-D63B-C832-A670-AEF36A8CB5FA}"/>
+          </ac:picMkLst>
+        </pc:picChg>
+        <pc:picChg chg="add mod">
+          <ac:chgData name="Ofer Zadikario" userId="f36b4b4543f14e71" providerId="LiveId" clId="{D6944E5A-F80B-4E16-8360-36A7472AE177}" dt="2024-02-16T10:27:10.515" v="5343" actId="1036"/>
+          <ac:picMkLst>
+            <pc:docMk/>
+            <pc:sldMk cId="3030916205" sldId="1993"/>
+            <ac:picMk id="12" creationId="{96B686D5-2910-A9C9-4727-D334A99B17ED}"/>
+          </ac:picMkLst>
+        </pc:picChg>
+        <pc:picChg chg="add mod">
+          <ac:chgData name="Ofer Zadikario" userId="f36b4b4543f14e71" providerId="LiveId" clId="{D6944E5A-F80B-4E16-8360-36A7472AE177}" dt="2024-02-16T10:27:10.515" v="5343" actId="1036"/>
+          <ac:picMkLst>
+            <pc:docMk/>
+            <pc:sldMk cId="3030916205" sldId="1993"/>
+            <ac:picMk id="14" creationId="{5CA532F1-04DB-691F-A26E-561A5E593DC0}"/>
+          </ac:picMkLst>
+        </pc:picChg>
+      </pc:sldChg>
+      <pc:sldChg chg="addSp modSp add mod">
+        <pc:chgData name="Ofer Zadikario" userId="f36b4b4543f14e71" providerId="LiveId" clId="{D6944E5A-F80B-4E16-8360-36A7472AE177}" dt="2024-02-16T10:27:25.109" v="5349" actId="20577"/>
+        <pc:sldMkLst>
+          <pc:docMk/>
+          <pc:sldMk cId="1374046110" sldId="1994"/>
+        </pc:sldMkLst>
+        <pc:spChg chg="mod">
+          <ac:chgData name="Ofer Zadikario" userId="f36b4b4543f14e71" providerId="LiveId" clId="{D6944E5A-F80B-4E16-8360-36A7472AE177}" dt="2024-02-16T10:27:25.109" v="5349" actId="20577"/>
+          <ac:spMkLst>
+            <pc:docMk/>
+            <pc:sldMk cId="1374046110" sldId="1994"/>
+            <ac:spMk id="2" creationId="{80E53C7D-00D4-F9FF-4637-5998E37DA8BC}"/>
+          </ac:spMkLst>
+        </pc:spChg>
+        <pc:spChg chg="mod">
+          <ac:chgData name="Ofer Zadikario" userId="f36b4b4543f14e71" providerId="LiveId" clId="{D6944E5A-F80B-4E16-8360-36A7472AE177}" dt="2024-02-16T10:20:05.499" v="5014" actId="108"/>
+          <ac:spMkLst>
+            <pc:docMk/>
+            <pc:sldMk cId="1374046110" sldId="1994"/>
+            <ac:spMk id="3" creationId="{9BBA2A9F-0BC2-E518-0F57-85D87FD53BE8}"/>
+          </ac:spMkLst>
+        </pc:spChg>
+        <pc:picChg chg="add mod">
+          <ac:chgData name="Ofer Zadikario" userId="f36b4b4543f14e71" providerId="LiveId" clId="{D6944E5A-F80B-4E16-8360-36A7472AE177}" dt="2024-02-16T10:21:19.956" v="5137" actId="1038"/>
+          <ac:picMkLst>
+            <pc:docMk/>
+            <pc:sldMk cId="1374046110" sldId="1994"/>
+            <ac:picMk id="5" creationId="{3FEE288B-D705-7CEF-8ABF-E562A48F89E0}"/>
+          </ac:picMkLst>
+        </pc:picChg>
+      </pc:sldChg>
+      <pc:sldChg chg="addSp modSp add mod">
+        <pc:chgData name="Ofer Zadikario" userId="f36b4b4543f14e71" providerId="LiveId" clId="{D6944E5A-F80B-4E16-8360-36A7472AE177}" dt="2024-02-16T10:28:20.674" v="5385" actId="1036"/>
+        <pc:sldMkLst>
+          <pc:docMk/>
+          <pc:sldMk cId="3828414849" sldId="1995"/>
+        </pc:sldMkLst>
+        <pc:spChg chg="mod">
+          <ac:chgData name="Ofer Zadikario" userId="f36b4b4543f14e71" providerId="LiveId" clId="{D6944E5A-F80B-4E16-8360-36A7472AE177}" dt="2024-02-16T10:27:52.327" v="5370" actId="20577"/>
+          <ac:spMkLst>
+            <pc:docMk/>
+            <pc:sldMk cId="3828414849" sldId="1995"/>
+            <ac:spMk id="2" creationId="{B3FFC726-6DA1-6002-3EBB-BFF9CBB5ABE0}"/>
+          </ac:spMkLst>
+        </pc:spChg>
+        <pc:spChg chg="mod">
+          <ac:chgData name="Ofer Zadikario" userId="f36b4b4543f14e71" providerId="LiveId" clId="{D6944E5A-F80B-4E16-8360-36A7472AE177}" dt="2024-02-16T10:28:20.674" v="5385" actId="1036"/>
+          <ac:spMkLst>
+            <pc:docMk/>
+            <pc:sldMk cId="3828414849" sldId="1995"/>
+            <ac:spMk id="3" creationId="{92B3F208-77BB-6E53-1878-61472513835F}"/>
+          </ac:spMkLst>
+        </pc:spChg>
+        <pc:spChg chg="mod">
+          <ac:chgData name="Ofer Zadikario" userId="f36b4b4543f14e71" providerId="LiveId" clId="{D6944E5A-F80B-4E16-8360-36A7472AE177}" dt="2024-02-16T10:28:20.674" v="5385" actId="1036"/>
+          <ac:spMkLst>
+            <pc:docMk/>
+            <pc:sldMk cId="3828414849" sldId="1995"/>
+            <ac:spMk id="8" creationId="{DFF6E131-4858-2572-1A61-64FC7D338333}"/>
+          </ac:spMkLst>
+        </pc:spChg>
+        <pc:picChg chg="add mod">
+          <ac:chgData name="Ofer Zadikario" userId="f36b4b4543f14e71" providerId="LiveId" clId="{D6944E5A-F80B-4E16-8360-36A7472AE177}" dt="2024-02-16T10:28:20.674" v="5385" actId="1036"/>
+          <ac:picMkLst>
+            <pc:docMk/>
+            <pc:sldMk cId="3828414849" sldId="1995"/>
+            <ac:picMk id="5" creationId="{E8BCB26B-5776-9C5F-61B2-D796B9798F67}"/>
+          </ac:picMkLst>
+        </pc:picChg>
+        <pc:picChg chg="add mod">
+          <ac:chgData name="Ofer Zadikario" userId="f36b4b4543f14e71" providerId="LiveId" clId="{D6944E5A-F80B-4E16-8360-36A7472AE177}" dt="2024-02-16T10:28:20.674" v="5385" actId="1036"/>
+          <ac:picMkLst>
+            <pc:docMk/>
+            <pc:sldMk cId="3828414849" sldId="1995"/>
+            <ac:picMk id="7" creationId="{406828A7-2207-D57F-16FF-D92F6465E64E}"/>
+          </ac:picMkLst>
+        </pc:picChg>
+        <pc:picChg chg="add mod">
+          <ac:chgData name="Ofer Zadikario" userId="f36b4b4543f14e71" providerId="LiveId" clId="{D6944E5A-F80B-4E16-8360-36A7472AE177}" dt="2024-02-16T10:28:20.674" v="5385" actId="1036"/>
+          <ac:picMkLst>
+            <pc:docMk/>
+            <pc:sldMk cId="3828414849" sldId="1995"/>
+            <ac:picMk id="10" creationId="{78CBE107-49A4-E08A-F364-B812F105EB78}"/>
+          </ac:picMkLst>
+        </pc:picChg>
       </pc:sldChg>
     </pc:docChg>
   </pc:docChgLst>
@@ -803,7 +964,7 @@
           <a:p>
             <a:fld id="{18438622-0837-4E9E-A16C-0B0206CE676E}" type="datetimeFigureOut">
               <a:rPr lang="en-US" smtClean="0"/>
-              <a:t>2/7/2024</a:t>
+              <a:t>2/16/2024</a:t>
             </a:fld>
             <a:endParaRPr lang="en-US"/>
           </a:p>
@@ -1208,7 +1369,7 @@
           <a:p>
             <a:fld id="{D18B56EA-E28F-4F92-9F16-7A6F2501B303}" type="datetime8">
               <a:rPr lang="en-US" smtClean="0"/>
-              <a:t>2/7/2024 11:55 AM</a:t>
+              <a:t>2/16/2024 12:00 PM</a:t>
             </a:fld>
             <a:endParaRPr lang="en-US" dirty="0"/>
           </a:p>
@@ -6682,7 +6843,7 @@
         <p:cNvPr id="1" name="">
           <a:extLst>
             <a:ext uri="{FF2B5EF4-FFF2-40B4-BE49-F238E27FC236}">
-              <a16:creationId xmlns:a16="http://schemas.microsoft.com/office/drawing/2014/main" id="{18E126E0-686F-31A2-BE54-1DBCC4B16DDF}"/>
+              <a16:creationId xmlns:a16="http://schemas.microsoft.com/office/drawing/2014/main" id="{1F964603-484C-1CC7-9683-0FF893F7DD00}"/>
             </a:ext>
           </a:extLst>
         </p:cNvPr>
@@ -6702,7 +6863,7 @@
           <p:cNvPr id="2" name="כותרת 1">
             <a:extLst>
               <a:ext uri="{FF2B5EF4-FFF2-40B4-BE49-F238E27FC236}">
-                <a16:creationId xmlns:a16="http://schemas.microsoft.com/office/drawing/2014/main" id="{F9C5F349-FE97-E574-8B57-AB8D3DD52D4C}"/>
+                <a16:creationId xmlns:a16="http://schemas.microsoft.com/office/drawing/2014/main" id="{FF93ECBD-2B08-A142-B5A0-4E89DC6EEDCE}"/>
               </a:ext>
             </a:extLst>
           </p:cNvPr>
@@ -6719,8 +6880,12 @@
           <a:lstStyle/>
           <a:p>
             <a:r>
+              <a:rPr lang="en-US" sz="3600" dirty="0"/>
+              <a:t>Quick Summary of how to work with Dependency Injection</a:t>
+            </a:r>
+            <a:r>
               <a:rPr lang="en-US" sz="4400" dirty="0"/>
-              <a:t>The process of building a multi page application:</a:t>
+              <a:t>:</a:t>
             </a:r>
             <a:endParaRPr lang="he-IL" dirty="0"/>
           </a:p>
@@ -6731,7 +6896,7 @@
           <p:cNvPr id="3" name="תיבת טקסט 2">
             <a:extLst>
               <a:ext uri="{FF2B5EF4-FFF2-40B4-BE49-F238E27FC236}">
-                <a16:creationId xmlns:a16="http://schemas.microsoft.com/office/drawing/2014/main" id="{565A5D49-CE3C-AAE4-23D6-A2BA9596D480}"/>
+                <a16:creationId xmlns:a16="http://schemas.microsoft.com/office/drawing/2014/main" id="{DBA24E19-32DB-ADA5-1CC8-9204A2E0440D}"/>
               </a:ext>
             </a:extLst>
           </p:cNvPr>
@@ -6740,8 +6905,8 @@
         </p:nvSpPr>
         <p:spPr>
           <a:xfrm>
-            <a:off x="516376" y="954290"/>
-            <a:ext cx="10388917" cy="5820055"/>
+            <a:off x="516376" y="1525024"/>
+            <a:ext cx="10388917" cy="4779770"/>
           </a:xfrm>
           <a:prstGeom prst="rect">
             <a:avLst/>
@@ -6765,21 +6930,46 @@
               <a:buChar char="•"/>
             </a:pPr>
             <a:r>
-              <a:rPr lang="en-US" sz="3200" dirty="0">
-                <a:gradFill>
-                  <a:gsLst>
-                    <a:gs pos="2917">
-                      <a:schemeClr val="tx1"/>
-                    </a:gs>
-                    <a:gs pos="30000">
-                      <a:schemeClr val="tx1"/>
-                    </a:gs>
-                  </a:gsLst>
-                  <a:lin ang="5400000" scaled="0"/>
-                </a:gradFill>
+              <a:rPr lang="en-US" sz="2400" dirty="0">
+                <a:solidFill>
+                  <a:srgbClr val="000000"/>
+                </a:solidFill>
+                <a:latin typeface="Cascadia Mono" panose="020B0609020000020004" pitchFamily="49" charset="0"/>
               </a:rPr>
-              <a:t>Use a Shell page class as the main page of the application</a:t>
-            </a:r>
+              <a:t>In the </a:t>
+            </a:r>
+            <a:r>
+              <a:rPr lang="en-US" sz="2400" dirty="0" err="1">
+                <a:solidFill>
+                  <a:srgbClr val="000000"/>
+                </a:solidFill>
+                <a:latin typeface="Cascadia Mono" panose="020B0609020000020004" pitchFamily="49" charset="0"/>
+              </a:rPr>
+              <a:t>MauiProgram</a:t>
+            </a:r>
+            <a:r>
+              <a:rPr lang="en-US" sz="2400" dirty="0">
+                <a:solidFill>
+                  <a:srgbClr val="000000"/>
+                </a:solidFill>
+                <a:latin typeface="Cascadia Mono" panose="020B0609020000020004" pitchFamily="49" charset="0"/>
+              </a:rPr>
+              <a:t> class – Register all Service, View Model and View classes using the Maui app builder:</a:t>
+            </a:r>
+            <a:br>
+              <a:rPr lang="en-US" sz="2400" dirty="0">
+                <a:solidFill>
+                  <a:srgbClr val="000000"/>
+                </a:solidFill>
+                <a:latin typeface="Cascadia Mono" panose="020B0609020000020004" pitchFamily="49" charset="0"/>
+              </a:rPr>
+            </a:br>
+            <a:endParaRPr lang="en-US" sz="2400" dirty="0">
+              <a:solidFill>
+                <a:srgbClr val="000000"/>
+              </a:solidFill>
+              <a:latin typeface="Cascadia Mono" panose="020B0609020000020004" pitchFamily="49" charset="0"/>
+            </a:endParaRPr>
           </a:p>
           <a:p>
             <a:pPr marL="342900" indent="-342900">
@@ -6792,22 +6982,12 @@
               <a:buFont typeface="Arial" panose="020B0604020202020204" pitchFamily="34" charset="0"/>
               <a:buChar char="•"/>
             </a:pPr>
-            <a:r>
-              <a:rPr lang="en-US" sz="3200" dirty="0">
-                <a:gradFill>
-                  <a:gsLst>
-                    <a:gs pos="2917">
-                      <a:schemeClr val="tx1"/>
-                    </a:gs>
-                    <a:gs pos="30000">
-                      <a:schemeClr val="tx1"/>
-                    </a:gs>
-                  </a:gsLst>
-                  <a:lin ang="5400000" scaled="0"/>
-                </a:gradFill>
-              </a:rPr>
-              <a:t>Register all pages, view models and services to be injected automatically (using the app builder)</a:t>
-            </a:r>
+            <a:endParaRPr lang="en-US" sz="2400" dirty="0">
+              <a:solidFill>
+                <a:srgbClr val="000000"/>
+              </a:solidFill>
+              <a:latin typeface="Cascadia Mono" panose="020B0609020000020004" pitchFamily="49" charset="0"/>
+            </a:endParaRPr>
           </a:p>
           <a:p>
             <a:pPr marL="342900" indent="-342900">
@@ -6821,37 +7001,22 @@
               <a:buChar char="•"/>
             </a:pPr>
             <a:r>
-              <a:rPr lang="en-US" sz="3200" dirty="0">
-                <a:gradFill>
-                  <a:gsLst>
-                    <a:gs pos="2917">
-                      <a:schemeClr val="tx1"/>
-                    </a:gs>
-                    <a:gs pos="30000">
-                      <a:schemeClr val="tx1"/>
-                    </a:gs>
-                  </a:gsLst>
-                  <a:lin ang="5400000" scaled="0"/>
-                </a:gradFill>
+              <a:rPr lang="en-US" sz="2400" dirty="0">
+                <a:solidFill>
+                  <a:srgbClr val="000000"/>
+                </a:solidFill>
+                <a:latin typeface="Cascadia Mono" panose="020B0609020000020004" pitchFamily="49" charset="0"/>
               </a:rPr>
-              <a:t>Define the story board of the application in the Shell </a:t>
-            </a:r>
-            <a:r>
-              <a:rPr lang="en-US" sz="3200" dirty="0" err="1">
-                <a:gradFill>
-                  <a:gsLst>
-                    <a:gs pos="2917">
-                      <a:schemeClr val="tx1"/>
-                    </a:gs>
-                    <a:gs pos="30000">
-                      <a:schemeClr val="tx1"/>
-                    </a:gs>
-                  </a:gsLst>
-                  <a:lin ang="5400000" scaled="0"/>
-                </a:gradFill>
+              <a:t>When writing Page classes constructor, add the page view model as parameter. On the view model classes constructor add the service class as parameter if necessary:</a:t>
+            </a:r>
+            <a:br>
+              <a:rPr lang="en-US" sz="2400" dirty="0">
+                <a:solidFill>
+                  <a:srgbClr val="000000"/>
+                </a:solidFill>
+                <a:latin typeface="Cascadia Mono" panose="020B0609020000020004" pitchFamily="49" charset="0"/>
               </a:rPr>
-              <a:t>Xaml</a:t>
-            </a:r>
+            </a:br>
             <a:endParaRPr lang="en-US" sz="3200" dirty="0">
               <a:gradFill>
                 <a:gsLst>
@@ -6867,6 +7032,52 @@
             </a:endParaRPr>
           </a:p>
           <a:p>
+            <a:pPr>
+              <a:lnSpc>
+                <a:spcPct val="90000"/>
+              </a:lnSpc>
+              <a:spcAft>
+                <a:spcPts val="600"/>
+              </a:spcAft>
+            </a:pPr>
+            <a:endParaRPr lang="en-US" sz="3200" dirty="0">
+              <a:gradFill>
+                <a:gsLst>
+                  <a:gs pos="2917">
+                    <a:schemeClr val="tx1"/>
+                  </a:gs>
+                  <a:gs pos="30000">
+                    <a:schemeClr val="tx1"/>
+                  </a:gs>
+                </a:gsLst>
+                <a:lin ang="5400000" scaled="0"/>
+              </a:gradFill>
+            </a:endParaRPr>
+          </a:p>
+          <a:p>
+            <a:pPr>
+              <a:lnSpc>
+                <a:spcPct val="90000"/>
+              </a:lnSpc>
+              <a:spcAft>
+                <a:spcPts val="600"/>
+              </a:spcAft>
+            </a:pPr>
+            <a:endParaRPr lang="en-US" sz="2000" dirty="0">
+              <a:gradFill>
+                <a:gsLst>
+                  <a:gs pos="2917">
+                    <a:schemeClr val="tx1"/>
+                  </a:gs>
+                  <a:gs pos="30000">
+                    <a:schemeClr val="tx1"/>
+                  </a:gs>
+                </a:gsLst>
+                <a:lin ang="5400000" scaled="0"/>
+              </a:gradFill>
+            </a:endParaRPr>
+          </a:p>
+          <a:p>
             <a:pPr marL="342900" indent="-342900">
               <a:lnSpc>
                 <a:spcPct val="90000"/>
@@ -6877,23 +7088,49 @@
               <a:buFont typeface="Arial" panose="020B0604020202020204" pitchFamily="34" charset="0"/>
               <a:buChar char="•"/>
             </a:pPr>
-            <a:r>
-              <a:rPr lang="en-US" sz="3200" dirty="0">
-                <a:gradFill>
-                  <a:gsLst>
-                    <a:gs pos="2917">
-                      <a:schemeClr val="tx1"/>
-                    </a:gs>
-                    <a:gs pos="30000">
-                      <a:schemeClr val="tx1"/>
-                    </a:gs>
-                  </a:gsLst>
-                  <a:lin ang="5400000" scaled="0"/>
-                </a:gradFill>
-              </a:rPr>
-              <a:t>Create the pages and view models after defining their input parameters</a:t>
-            </a:r>
-          </a:p>
+            <a:endParaRPr lang="en-US" sz="2000" dirty="0">
+              <a:gradFill>
+                <a:gsLst>
+                  <a:gs pos="2917">
+                    <a:schemeClr val="tx1"/>
+                  </a:gs>
+                  <a:gs pos="30000">
+                    <a:schemeClr val="tx1"/>
+                  </a:gs>
+                </a:gsLst>
+                <a:lin ang="5400000" scaled="0"/>
+              </a:gradFill>
+            </a:endParaRPr>
+          </a:p>
+        </p:txBody>
+      </p:sp>
+      <p:sp>
+        <p:nvSpPr>
+          <p:cNvPr id="8" name="תיבת טקסט 7">
+            <a:extLst>
+              <a:ext uri="{FF2B5EF4-FFF2-40B4-BE49-F238E27FC236}">
+                <a16:creationId xmlns:a16="http://schemas.microsoft.com/office/drawing/2014/main" id="{7C0653E7-86BF-1B6E-04AA-0C82EE304C1F}"/>
+              </a:ext>
+            </a:extLst>
+          </p:cNvPr>
+          <p:cNvSpPr txBox="1"/>
+          <p:nvPr/>
+        </p:nvSpPr>
+        <p:spPr>
+          <a:xfrm>
+            <a:off x="656985" y="4416593"/>
+            <a:ext cx="11094098" cy="572464"/>
+          </a:xfrm>
+          <a:prstGeom prst="rect">
+            <a:avLst/>
+          </a:prstGeom>
+          <a:noFill/>
+        </p:spPr>
+        <p:txBody>
+          <a:bodyPr wrap="square" lIns="182880" tIns="146304" rIns="182880" bIns="146304" rtlCol="1">
+            <a:spAutoFit/>
+          </a:bodyPr>
+          <a:lstStyle/>
           <a:p>
             <a:pPr>
               <a:lnSpc>
@@ -6903,6 +7140,667 @@
                 <a:spcPts val="600"/>
               </a:spcAft>
             </a:pPr>
+            <a:endParaRPr lang="en-US" sz="2000" dirty="0">
+              <a:gradFill>
+                <a:gsLst>
+                  <a:gs pos="2917">
+                    <a:schemeClr val="tx1"/>
+                  </a:gs>
+                  <a:gs pos="30000">
+                    <a:schemeClr val="tx1"/>
+                  </a:gs>
+                </a:gsLst>
+                <a:lin ang="5400000" scaled="0"/>
+              </a:gradFill>
+            </a:endParaRPr>
+          </a:p>
+        </p:txBody>
+      </p:sp>
+      <p:pic>
+        <p:nvPicPr>
+          <p:cNvPr id="7" name="Picture 6">
+            <a:extLst>
+              <a:ext uri="{FF2B5EF4-FFF2-40B4-BE49-F238E27FC236}">
+                <a16:creationId xmlns:a16="http://schemas.microsoft.com/office/drawing/2014/main" id="{BA999826-E2E5-96BA-B9B8-0715858B2345}"/>
+              </a:ext>
+            </a:extLst>
+          </p:cNvPr>
+          <p:cNvPicPr>
+            <a:picLocks noChangeAspect="1"/>
+          </p:cNvPicPr>
+          <p:nvPr/>
+        </p:nvPicPr>
+        <p:blipFill>
+          <a:blip r:embed="rId2"/>
+          <a:stretch>
+            <a:fillRect/>
+          </a:stretch>
+        </p:blipFill>
+        <p:spPr>
+          <a:xfrm>
+            <a:off x="1061132" y="2329824"/>
+            <a:ext cx="3441877" cy="222261"/>
+          </a:xfrm>
+          <a:prstGeom prst="rect">
+            <a:avLst/>
+          </a:prstGeom>
+        </p:spPr>
+      </p:pic>
+      <p:pic>
+        <p:nvPicPr>
+          <p:cNvPr id="10" name="Picture 9">
+            <a:extLst>
+              <a:ext uri="{FF2B5EF4-FFF2-40B4-BE49-F238E27FC236}">
+                <a16:creationId xmlns:a16="http://schemas.microsoft.com/office/drawing/2014/main" id="{C5429A9B-D63B-C832-A670-AEF36A8CB5FA}"/>
+              </a:ext>
+            </a:extLst>
+          </p:cNvPr>
+          <p:cNvPicPr>
+            <a:picLocks noChangeAspect="1"/>
+          </p:cNvPicPr>
+          <p:nvPr/>
+        </p:nvPicPr>
+        <p:blipFill>
+          <a:blip r:embed="rId3"/>
+          <a:stretch>
+            <a:fillRect/>
+          </a:stretch>
+        </p:blipFill>
+        <p:spPr>
+          <a:xfrm>
+            <a:off x="1032720" y="2578479"/>
+            <a:ext cx="3854648" cy="215911"/>
+          </a:xfrm>
+          <a:prstGeom prst="rect">
+            <a:avLst/>
+          </a:prstGeom>
+        </p:spPr>
+      </p:pic>
+      <p:pic>
+        <p:nvPicPr>
+          <p:cNvPr id="12" name="Picture 11">
+            <a:extLst>
+              <a:ext uri="{FF2B5EF4-FFF2-40B4-BE49-F238E27FC236}">
+                <a16:creationId xmlns:a16="http://schemas.microsoft.com/office/drawing/2014/main" id="{96B686D5-2910-A9C9-4727-D334A99B17ED}"/>
+              </a:ext>
+            </a:extLst>
+          </p:cNvPr>
+          <p:cNvPicPr>
+            <a:picLocks noChangeAspect="1"/>
+          </p:cNvPicPr>
+          <p:nvPr/>
+        </p:nvPicPr>
+        <p:blipFill>
+          <a:blip r:embed="rId4"/>
+          <a:stretch>
+            <a:fillRect/>
+          </a:stretch>
+        </p:blipFill>
+        <p:spPr>
+          <a:xfrm>
+            <a:off x="1061132" y="4552228"/>
+            <a:ext cx="3168813" cy="946199"/>
+          </a:xfrm>
+          <a:prstGeom prst="rect">
+            <a:avLst/>
+          </a:prstGeom>
+        </p:spPr>
+      </p:pic>
+      <p:pic>
+        <p:nvPicPr>
+          <p:cNvPr id="14" name="Picture 13">
+            <a:extLst>
+              <a:ext uri="{FF2B5EF4-FFF2-40B4-BE49-F238E27FC236}">
+                <a16:creationId xmlns:a16="http://schemas.microsoft.com/office/drawing/2014/main" id="{5CA532F1-04DB-691F-A26E-561A5E593DC0}"/>
+              </a:ext>
+            </a:extLst>
+          </p:cNvPr>
+          <p:cNvPicPr>
+            <a:picLocks noChangeAspect="1"/>
+          </p:cNvPicPr>
+          <p:nvPr/>
+        </p:nvPicPr>
+        <p:blipFill>
+          <a:blip r:embed="rId5"/>
+          <a:stretch>
+            <a:fillRect/>
+          </a:stretch>
+        </p:blipFill>
+        <p:spPr>
+          <a:xfrm>
+            <a:off x="4634092" y="4552224"/>
+            <a:ext cx="3784795" cy="1022403"/>
+          </a:xfrm>
+          <a:prstGeom prst="rect">
+            <a:avLst/>
+          </a:prstGeom>
+        </p:spPr>
+      </p:pic>
+    </p:spTree>
+    <p:extLst>
+      <p:ext uri="{BB962C8B-B14F-4D97-AF65-F5344CB8AC3E}">
+        <p14:creationId xmlns:p14="http://schemas.microsoft.com/office/powerpoint/2010/main" val="3030916205"/>
+      </p:ext>
+    </p:extLst>
+  </p:cSld>
+  <p:clrMapOvr>
+    <a:masterClrMapping/>
+  </p:clrMapOvr>
+</p:sld>
+</file>
+
+<file path=ppt/slides/slide12.xml><?xml version="1.0" encoding="utf-8"?>
+<p:sld xmlns:a="http://schemas.openxmlformats.org/drawingml/2006/main" xmlns:r="http://schemas.openxmlformats.org/officeDocument/2006/relationships" xmlns:p="http://schemas.openxmlformats.org/presentationml/2006/main">
+  <p:cSld>
+    <p:spTree>
+      <p:nvGrpSpPr>
+        <p:cNvPr id="1" name="">
+          <a:extLst>
+            <a:ext uri="{FF2B5EF4-FFF2-40B4-BE49-F238E27FC236}">
+              <a16:creationId xmlns:a16="http://schemas.microsoft.com/office/drawing/2014/main" id="{56F5B843-5DF8-85B7-9A68-6DED8EAF4892}"/>
+            </a:ext>
+          </a:extLst>
+        </p:cNvPr>
+        <p:cNvGrpSpPr/>
+        <p:nvPr/>
+      </p:nvGrpSpPr>
+      <p:grpSpPr>
+        <a:xfrm>
+          <a:off x="0" y="0"/>
+          <a:ext cx="0" cy="0"/>
+          <a:chOff x="0" y="0"/>
+          <a:chExt cx="0" cy="0"/>
+        </a:xfrm>
+      </p:grpSpPr>
+      <p:sp>
+        <p:nvSpPr>
+          <p:cNvPr id="2" name="כותרת 1">
+            <a:extLst>
+              <a:ext uri="{FF2B5EF4-FFF2-40B4-BE49-F238E27FC236}">
+                <a16:creationId xmlns:a16="http://schemas.microsoft.com/office/drawing/2014/main" id="{80E53C7D-00D4-F9FF-4637-5998E37DA8BC}"/>
+              </a:ext>
+            </a:extLst>
+          </p:cNvPr>
+          <p:cNvSpPr>
+            <a:spLocks noGrp="1"/>
+          </p:cNvSpPr>
+          <p:nvPr>
+            <p:ph type="title"/>
+          </p:nvPr>
+        </p:nvSpPr>
+        <p:spPr/>
+        <p:txBody>
+          <a:bodyPr/>
+          <a:lstStyle/>
+          <a:p>
+            <a:r>
+              <a:rPr lang="en-US" sz="4400" dirty="0"/>
+              <a:t>Quick Summary of how to work with Routes:</a:t>
+            </a:r>
+            <a:endParaRPr lang="he-IL" dirty="0"/>
+          </a:p>
+        </p:txBody>
+      </p:sp>
+      <p:sp>
+        <p:nvSpPr>
+          <p:cNvPr id="3" name="תיבת טקסט 2">
+            <a:extLst>
+              <a:ext uri="{FF2B5EF4-FFF2-40B4-BE49-F238E27FC236}">
+                <a16:creationId xmlns:a16="http://schemas.microsoft.com/office/drawing/2014/main" id="{9BBA2A9F-0BC2-E518-0F57-85D87FD53BE8}"/>
+              </a:ext>
+            </a:extLst>
+          </p:cNvPr>
+          <p:cNvSpPr txBox="1"/>
+          <p:nvPr/>
+        </p:nvSpPr>
+        <p:spPr>
+          <a:xfrm>
+            <a:off x="516376" y="954290"/>
+            <a:ext cx="10388917" cy="2077492"/>
+          </a:xfrm>
+          <a:prstGeom prst="rect">
+            <a:avLst/>
+          </a:prstGeom>
+          <a:noFill/>
+        </p:spPr>
+        <p:txBody>
+          <a:bodyPr wrap="square" lIns="182880" tIns="146304" rIns="182880" bIns="146304" rtlCol="1">
+            <a:spAutoFit/>
+          </a:bodyPr>
+          <a:lstStyle/>
+          <a:p>
+            <a:pPr marL="342900" indent="-342900">
+              <a:lnSpc>
+                <a:spcPct val="90000"/>
+              </a:lnSpc>
+              <a:spcAft>
+                <a:spcPts val="600"/>
+              </a:spcAft>
+              <a:buFont typeface="Arial" panose="020B0604020202020204" pitchFamily="34" charset="0"/>
+              <a:buChar char="•"/>
+            </a:pPr>
+            <a:r>
+              <a:rPr lang="en-US" sz="2400" dirty="0">
+                <a:solidFill>
+                  <a:srgbClr val="000000"/>
+                </a:solidFill>
+                <a:latin typeface="Cascadia Mono" panose="020B0609020000020004" pitchFamily="49" charset="0"/>
+              </a:rPr>
+              <a:t>In the </a:t>
+            </a:r>
+            <a:r>
+              <a:rPr lang="en-US" sz="2400" dirty="0" err="1">
+                <a:solidFill>
+                  <a:srgbClr val="000000"/>
+                </a:solidFill>
+                <a:latin typeface="Cascadia Mono" panose="020B0609020000020004" pitchFamily="49" charset="0"/>
+              </a:rPr>
+              <a:t>AppShell</a:t>
+            </a:r>
+            <a:r>
+              <a:rPr lang="en-US" sz="2400" dirty="0">
+                <a:solidFill>
+                  <a:srgbClr val="000000"/>
+                </a:solidFill>
+                <a:latin typeface="Cascadia Mono" panose="020B0609020000020004" pitchFamily="49" charset="0"/>
+              </a:rPr>
+              <a:t> class constructor – Register all Routes!</a:t>
+            </a:r>
+          </a:p>
+          <a:p>
+            <a:pPr marL="342900" indent="-342900">
+              <a:lnSpc>
+                <a:spcPct val="90000"/>
+              </a:lnSpc>
+              <a:spcAft>
+                <a:spcPts val="600"/>
+              </a:spcAft>
+              <a:buFont typeface="Arial" panose="020B0604020202020204" pitchFamily="34" charset="0"/>
+              <a:buChar char="•"/>
+            </a:pPr>
+            <a:endParaRPr lang="en-US" sz="2400" dirty="0">
+              <a:solidFill>
+                <a:srgbClr val="000000"/>
+              </a:solidFill>
+              <a:latin typeface="Cascadia Mono" panose="020B0609020000020004" pitchFamily="49" charset="0"/>
+            </a:endParaRPr>
+          </a:p>
+          <a:p>
+            <a:pPr>
+              <a:lnSpc>
+                <a:spcPct val="90000"/>
+              </a:lnSpc>
+              <a:spcAft>
+                <a:spcPts val="600"/>
+              </a:spcAft>
+            </a:pPr>
+            <a:endParaRPr lang="en-US" sz="2000" dirty="0">
+              <a:gradFill>
+                <a:gsLst>
+                  <a:gs pos="2917">
+                    <a:schemeClr val="tx1"/>
+                  </a:gs>
+                  <a:gs pos="30000">
+                    <a:schemeClr val="tx1"/>
+                  </a:gs>
+                </a:gsLst>
+                <a:lin ang="5400000" scaled="0"/>
+              </a:gradFill>
+            </a:endParaRPr>
+          </a:p>
+          <a:p>
+            <a:pPr marL="342900" indent="-342900">
+              <a:lnSpc>
+                <a:spcPct val="90000"/>
+              </a:lnSpc>
+              <a:spcAft>
+                <a:spcPts val="600"/>
+              </a:spcAft>
+              <a:buFont typeface="Arial" panose="020B0604020202020204" pitchFamily="34" charset="0"/>
+              <a:buChar char="•"/>
+            </a:pPr>
+            <a:endParaRPr lang="en-US" sz="2000" dirty="0">
+              <a:gradFill>
+                <a:gsLst>
+                  <a:gs pos="2917">
+                    <a:schemeClr val="tx1"/>
+                  </a:gs>
+                  <a:gs pos="30000">
+                    <a:schemeClr val="tx1"/>
+                  </a:gs>
+                </a:gsLst>
+                <a:lin ang="5400000" scaled="0"/>
+              </a:gradFill>
+            </a:endParaRPr>
+          </a:p>
+        </p:txBody>
+      </p:sp>
+      <p:sp>
+        <p:nvSpPr>
+          <p:cNvPr id="8" name="תיבת טקסט 7">
+            <a:extLst>
+              <a:ext uri="{FF2B5EF4-FFF2-40B4-BE49-F238E27FC236}">
+                <a16:creationId xmlns:a16="http://schemas.microsoft.com/office/drawing/2014/main" id="{4441CB51-8A05-F476-9A7F-DB23BCD171D6}"/>
+              </a:ext>
+            </a:extLst>
+          </p:cNvPr>
+          <p:cNvSpPr txBox="1"/>
+          <p:nvPr/>
+        </p:nvSpPr>
+        <p:spPr>
+          <a:xfrm>
+            <a:off x="656985" y="3845859"/>
+            <a:ext cx="11094098" cy="572464"/>
+          </a:xfrm>
+          <a:prstGeom prst="rect">
+            <a:avLst/>
+          </a:prstGeom>
+          <a:noFill/>
+        </p:spPr>
+        <p:txBody>
+          <a:bodyPr wrap="square" lIns="182880" tIns="146304" rIns="182880" bIns="146304" rtlCol="1">
+            <a:spAutoFit/>
+          </a:bodyPr>
+          <a:lstStyle/>
+          <a:p>
+            <a:pPr>
+              <a:lnSpc>
+                <a:spcPct val="90000"/>
+              </a:lnSpc>
+              <a:spcAft>
+                <a:spcPts val="600"/>
+              </a:spcAft>
+            </a:pPr>
+            <a:endParaRPr lang="en-US" sz="2000" dirty="0">
+              <a:gradFill>
+                <a:gsLst>
+                  <a:gs pos="2917">
+                    <a:schemeClr val="tx1"/>
+                  </a:gs>
+                  <a:gs pos="30000">
+                    <a:schemeClr val="tx1"/>
+                  </a:gs>
+                </a:gsLst>
+                <a:lin ang="5400000" scaled="0"/>
+              </a:gradFill>
+            </a:endParaRPr>
+          </a:p>
+        </p:txBody>
+      </p:sp>
+      <p:pic>
+        <p:nvPicPr>
+          <p:cNvPr id="5" name="Picture 4">
+            <a:extLst>
+              <a:ext uri="{FF2B5EF4-FFF2-40B4-BE49-F238E27FC236}">
+                <a16:creationId xmlns:a16="http://schemas.microsoft.com/office/drawing/2014/main" id="{3FEE288B-D705-7CEF-8ABF-E562A48F89E0}"/>
+              </a:ext>
+            </a:extLst>
+          </p:cNvPr>
+          <p:cNvPicPr>
+            <a:picLocks noChangeAspect="1"/>
+          </p:cNvPicPr>
+          <p:nvPr/>
+        </p:nvPicPr>
+        <p:blipFill>
+          <a:blip r:embed="rId2"/>
+          <a:stretch>
+            <a:fillRect/>
+          </a:stretch>
+        </p:blipFill>
+        <p:spPr>
+          <a:xfrm>
+            <a:off x="1028908" y="1741704"/>
+            <a:ext cx="5359675" cy="1987652"/>
+          </a:xfrm>
+          <a:prstGeom prst="rect">
+            <a:avLst/>
+          </a:prstGeom>
+        </p:spPr>
+      </p:pic>
+    </p:spTree>
+    <p:extLst>
+      <p:ext uri="{BB962C8B-B14F-4D97-AF65-F5344CB8AC3E}">
+        <p14:creationId xmlns:p14="http://schemas.microsoft.com/office/powerpoint/2010/main" val="1374046110"/>
+      </p:ext>
+    </p:extLst>
+  </p:cSld>
+  <p:clrMapOvr>
+    <a:masterClrMapping/>
+  </p:clrMapOvr>
+</p:sld>
+</file>
+
+<file path=ppt/slides/slide13.xml><?xml version="1.0" encoding="utf-8"?>
+<p:sld xmlns:a="http://schemas.openxmlformats.org/drawingml/2006/main" xmlns:r="http://schemas.openxmlformats.org/officeDocument/2006/relationships" xmlns:p="http://schemas.openxmlformats.org/presentationml/2006/main">
+  <p:cSld>
+    <p:spTree>
+      <p:nvGrpSpPr>
+        <p:cNvPr id="1" name="">
+          <a:extLst>
+            <a:ext uri="{FF2B5EF4-FFF2-40B4-BE49-F238E27FC236}">
+              <a16:creationId xmlns:a16="http://schemas.microsoft.com/office/drawing/2014/main" id="{BCEB6B56-04E1-B287-CB82-43B2DD90C37C}"/>
+            </a:ext>
+          </a:extLst>
+        </p:cNvPr>
+        <p:cNvGrpSpPr/>
+        <p:nvPr/>
+      </p:nvGrpSpPr>
+      <p:grpSpPr>
+        <a:xfrm>
+          <a:off x="0" y="0"/>
+          <a:ext cx="0" cy="0"/>
+          <a:chOff x="0" y="0"/>
+          <a:chExt cx="0" cy="0"/>
+        </a:xfrm>
+      </p:grpSpPr>
+      <p:sp>
+        <p:nvSpPr>
+          <p:cNvPr id="2" name="כותרת 1">
+            <a:extLst>
+              <a:ext uri="{FF2B5EF4-FFF2-40B4-BE49-F238E27FC236}">
+                <a16:creationId xmlns:a16="http://schemas.microsoft.com/office/drawing/2014/main" id="{B3FFC726-6DA1-6002-3EBB-BFF9CBB5ABE0}"/>
+              </a:ext>
+            </a:extLst>
+          </p:cNvPr>
+          <p:cNvSpPr>
+            <a:spLocks noGrp="1"/>
+          </p:cNvSpPr>
+          <p:nvPr>
+            <p:ph type="title"/>
+          </p:nvPr>
+        </p:nvSpPr>
+        <p:spPr/>
+        <p:txBody>
+          <a:bodyPr/>
+          <a:lstStyle/>
+          <a:p>
+            <a:r>
+              <a:rPr lang="en-US" sz="4400" dirty="0"/>
+              <a:t>Quick Summary of how to open pages with Shell:</a:t>
+            </a:r>
+            <a:endParaRPr lang="he-IL" dirty="0"/>
+          </a:p>
+        </p:txBody>
+      </p:sp>
+      <p:sp>
+        <p:nvSpPr>
+          <p:cNvPr id="3" name="תיבת טקסט 2">
+            <a:extLst>
+              <a:ext uri="{FF2B5EF4-FFF2-40B4-BE49-F238E27FC236}">
+                <a16:creationId xmlns:a16="http://schemas.microsoft.com/office/drawing/2014/main" id="{92B3F208-77BB-6E53-1878-61472513835F}"/>
+              </a:ext>
+            </a:extLst>
+          </p:cNvPr>
+          <p:cNvSpPr txBox="1"/>
+          <p:nvPr/>
+        </p:nvSpPr>
+        <p:spPr>
+          <a:xfrm>
+            <a:off x="516376" y="1205907"/>
+            <a:ext cx="10388917" cy="5853910"/>
+          </a:xfrm>
+          <a:prstGeom prst="rect">
+            <a:avLst/>
+          </a:prstGeom>
+          <a:noFill/>
+        </p:spPr>
+        <p:txBody>
+          <a:bodyPr wrap="square" lIns="182880" tIns="146304" rIns="182880" bIns="146304" rtlCol="1">
+            <a:spAutoFit/>
+          </a:bodyPr>
+          <a:lstStyle/>
+          <a:p>
+            <a:pPr marL="342900" indent="-342900">
+              <a:lnSpc>
+                <a:spcPct val="90000"/>
+              </a:lnSpc>
+              <a:spcAft>
+                <a:spcPts val="600"/>
+              </a:spcAft>
+              <a:buFont typeface="Arial" panose="020B0604020202020204" pitchFamily="34" charset="0"/>
+              <a:buChar char="•"/>
+            </a:pPr>
+            <a:r>
+              <a:rPr lang="en-US" sz="2400" dirty="0">
+                <a:solidFill>
+                  <a:srgbClr val="000000"/>
+                </a:solidFill>
+                <a:latin typeface="Cascadia Mono" panose="020B0609020000020004" pitchFamily="49" charset="0"/>
+              </a:rPr>
+              <a:t>Use </a:t>
+            </a:r>
+            <a:r>
+              <a:rPr lang="en-US" sz="2400" dirty="0" err="1">
+                <a:solidFill>
+                  <a:srgbClr val="000000"/>
+                </a:solidFill>
+                <a:latin typeface="Cascadia Mono" panose="020B0609020000020004" pitchFamily="49" charset="0"/>
+              </a:rPr>
+              <a:t>Shell.Current.GotoAsync</a:t>
+            </a:r>
+            <a:r>
+              <a:rPr lang="en-US" sz="2400" dirty="0">
+                <a:solidFill>
+                  <a:srgbClr val="000000"/>
+                </a:solidFill>
+                <a:latin typeface="Cascadia Mono" panose="020B0609020000020004" pitchFamily="49" charset="0"/>
+              </a:rPr>
+              <a:t> method to open new pages.</a:t>
+            </a:r>
+            <a:br>
+              <a:rPr lang="en-US" sz="2400" dirty="0">
+                <a:solidFill>
+                  <a:srgbClr val="000000"/>
+                </a:solidFill>
+                <a:latin typeface="Cascadia Mono" panose="020B0609020000020004" pitchFamily="49" charset="0"/>
+              </a:rPr>
+            </a:br>
+            <a:endParaRPr lang="en-US" sz="2400" dirty="0">
+              <a:solidFill>
+                <a:srgbClr val="000000"/>
+              </a:solidFill>
+              <a:latin typeface="Cascadia Mono" panose="020B0609020000020004" pitchFamily="49" charset="0"/>
+            </a:endParaRPr>
+          </a:p>
+          <a:p>
+            <a:pPr marL="342900" indent="-342900">
+              <a:lnSpc>
+                <a:spcPct val="90000"/>
+              </a:lnSpc>
+              <a:spcAft>
+                <a:spcPts val="600"/>
+              </a:spcAft>
+              <a:buFont typeface="Arial" panose="020B0604020202020204" pitchFamily="34" charset="0"/>
+              <a:buChar char="•"/>
+            </a:pPr>
+            <a:r>
+              <a:rPr lang="en-US" sz="2400" dirty="0">
+                <a:solidFill>
+                  <a:srgbClr val="000000"/>
+                </a:solidFill>
+                <a:latin typeface="Cascadia Mono" panose="020B0609020000020004" pitchFamily="49" charset="0"/>
+              </a:rPr>
+              <a:t>If the new page works with input parameters:</a:t>
+            </a:r>
+          </a:p>
+          <a:p>
+            <a:pPr marL="800100" lvl="1" indent="-342900">
+              <a:lnSpc>
+                <a:spcPct val="90000"/>
+              </a:lnSpc>
+              <a:spcAft>
+                <a:spcPts val="600"/>
+              </a:spcAft>
+              <a:buFont typeface="Arial" panose="020B0604020202020204" pitchFamily="34" charset="0"/>
+              <a:buChar char="•"/>
+            </a:pPr>
+            <a:r>
+              <a:rPr lang="en-US" sz="2400" dirty="0">
+                <a:solidFill>
+                  <a:srgbClr val="000000"/>
+                </a:solidFill>
+                <a:latin typeface="Cascadia Mono" panose="020B0609020000020004" pitchFamily="49" charset="0"/>
+              </a:rPr>
+              <a:t>Create A Dictionary&lt;string, object&gt; and insert into it all input parameters for the new page. Each parameter object should be named by a string.</a:t>
+            </a:r>
+            <a:br>
+              <a:rPr lang="en-US" sz="2400" dirty="0">
+                <a:solidFill>
+                  <a:srgbClr val="000000"/>
+                </a:solidFill>
+                <a:latin typeface="Cascadia Mono" panose="020B0609020000020004" pitchFamily="49" charset="0"/>
+              </a:rPr>
+            </a:br>
+            <a:br>
+              <a:rPr lang="en-US" sz="2400" dirty="0">
+                <a:solidFill>
+                  <a:srgbClr val="000000"/>
+                </a:solidFill>
+                <a:latin typeface="Cascadia Mono" panose="020B0609020000020004" pitchFamily="49" charset="0"/>
+              </a:rPr>
+            </a:br>
+            <a:endParaRPr lang="en-US" sz="2400" dirty="0">
+              <a:solidFill>
+                <a:srgbClr val="000000"/>
+              </a:solidFill>
+              <a:latin typeface="Cascadia Mono" panose="020B0609020000020004" pitchFamily="49" charset="0"/>
+            </a:endParaRPr>
+          </a:p>
+          <a:p>
+            <a:pPr marL="800100" lvl="1" indent="-342900">
+              <a:lnSpc>
+                <a:spcPct val="90000"/>
+              </a:lnSpc>
+              <a:spcAft>
+                <a:spcPts val="600"/>
+              </a:spcAft>
+              <a:buFont typeface="Arial" panose="020B0604020202020204" pitchFamily="34" charset="0"/>
+              <a:buChar char="•"/>
+            </a:pPr>
+            <a:r>
+              <a:rPr lang="en-US" sz="2400" dirty="0">
+                <a:solidFill>
+                  <a:srgbClr val="000000"/>
+                </a:solidFill>
+                <a:latin typeface="Cascadia Mono" panose="020B0609020000020004" pitchFamily="49" charset="0"/>
+              </a:rPr>
+              <a:t>On the new page view model, add a macro to connect every parameter to a property in the view model class.</a:t>
+            </a:r>
+            <a:br>
+              <a:rPr lang="en-US" sz="3200" dirty="0">
+                <a:gradFill>
+                  <a:gsLst>
+                    <a:gs pos="2917">
+                      <a:schemeClr val="tx1"/>
+                    </a:gs>
+                    <a:gs pos="30000">
+                      <a:schemeClr val="tx1"/>
+                    </a:gs>
+                  </a:gsLst>
+                  <a:lin ang="5400000" scaled="0"/>
+                </a:gradFill>
+              </a:rPr>
+            </a:br>
             <a:endParaRPr lang="en-US" sz="3200" dirty="0">
               <a:gradFill>
                 <a:gsLst>
@@ -6997,7 +7895,7 @@
           <p:cNvPr id="8" name="תיבת טקסט 7">
             <a:extLst>
               <a:ext uri="{FF2B5EF4-FFF2-40B4-BE49-F238E27FC236}">
-                <a16:creationId xmlns:a16="http://schemas.microsoft.com/office/drawing/2014/main" id="{E39D26C7-AFC9-DD56-40FA-BF6F348C370B}"/>
+                <a16:creationId xmlns:a16="http://schemas.microsoft.com/office/drawing/2014/main" id="{DFF6E131-4858-2572-1A61-64FC7D338333}"/>
               </a:ext>
             </a:extLst>
           </p:cNvPr>
@@ -7006,7 +7904,7 @@
         </p:nvSpPr>
         <p:spPr>
           <a:xfrm>
-            <a:off x="656985" y="3845859"/>
+            <a:off x="656985" y="4097476"/>
             <a:ext cx="11094098" cy="572464"/>
           </a:xfrm>
           <a:prstGeom prst="rect">
@@ -7044,10 +7942,100 @@
           </a:p>
         </p:txBody>
       </p:sp>
+      <p:pic>
+        <p:nvPicPr>
+          <p:cNvPr id="5" name="Picture 4">
+            <a:extLst>
+              <a:ext uri="{FF2B5EF4-FFF2-40B4-BE49-F238E27FC236}">
+                <a16:creationId xmlns:a16="http://schemas.microsoft.com/office/drawing/2014/main" id="{E8BCB26B-5776-9C5F-61B2-D796B9798F67}"/>
+              </a:ext>
+            </a:extLst>
+          </p:cNvPr>
+          <p:cNvPicPr>
+            <a:picLocks noChangeAspect="1"/>
+          </p:cNvPicPr>
+          <p:nvPr/>
+        </p:nvPicPr>
+        <p:blipFill>
+          <a:blip r:embed="rId2"/>
+          <a:stretch>
+            <a:fillRect/>
+          </a:stretch>
+        </p:blipFill>
+        <p:spPr>
+          <a:xfrm>
+            <a:off x="1008727" y="1762698"/>
+            <a:ext cx="4369025" cy="190510"/>
+          </a:xfrm>
+          <a:prstGeom prst="rect">
+            <a:avLst/>
+          </a:prstGeom>
+        </p:spPr>
+      </p:pic>
+      <p:pic>
+        <p:nvPicPr>
+          <p:cNvPr id="7" name="Picture 6">
+            <a:extLst>
+              <a:ext uri="{FF2B5EF4-FFF2-40B4-BE49-F238E27FC236}">
+                <a16:creationId xmlns:a16="http://schemas.microsoft.com/office/drawing/2014/main" id="{406828A7-2207-D57F-16FF-D92F6465E64E}"/>
+              </a:ext>
+            </a:extLst>
+          </p:cNvPr>
+          <p:cNvPicPr>
+            <a:picLocks noChangeAspect="1"/>
+          </p:cNvPicPr>
+          <p:nvPr/>
+        </p:nvPicPr>
+        <p:blipFill>
+          <a:blip r:embed="rId3"/>
+          <a:stretch>
+            <a:fillRect/>
+          </a:stretch>
+        </p:blipFill>
+        <p:spPr>
+          <a:xfrm>
+            <a:off x="1517159" y="3550172"/>
+            <a:ext cx="3511730" cy="641383"/>
+          </a:xfrm>
+          <a:prstGeom prst="rect">
+            <a:avLst/>
+          </a:prstGeom>
+        </p:spPr>
+      </p:pic>
+      <p:pic>
+        <p:nvPicPr>
+          <p:cNvPr id="10" name="Picture 9">
+            <a:extLst>
+              <a:ext uri="{FF2B5EF4-FFF2-40B4-BE49-F238E27FC236}">
+                <a16:creationId xmlns:a16="http://schemas.microsoft.com/office/drawing/2014/main" id="{78CBE107-49A4-E08A-F364-B812F105EB78}"/>
+              </a:ext>
+            </a:extLst>
+          </p:cNvPr>
+          <p:cNvPicPr>
+            <a:picLocks noChangeAspect="1"/>
+          </p:cNvPicPr>
+          <p:nvPr/>
+        </p:nvPicPr>
+        <p:blipFill>
+          <a:blip r:embed="rId4"/>
+          <a:stretch>
+            <a:fillRect/>
+          </a:stretch>
+        </p:blipFill>
+        <p:spPr>
+          <a:xfrm>
+            <a:off x="1517159" y="5451951"/>
+            <a:ext cx="4438878" cy="673135"/>
+          </a:xfrm>
+          <a:prstGeom prst="rect">
+            <a:avLst/>
+          </a:prstGeom>
+        </p:spPr>
+      </p:pic>
     </p:spTree>
     <p:extLst>
       <p:ext uri="{BB962C8B-B14F-4D97-AF65-F5344CB8AC3E}">
-        <p14:creationId xmlns:p14="http://schemas.microsoft.com/office/powerpoint/2010/main" val="1917545158"/>
+        <p14:creationId xmlns:p14="http://schemas.microsoft.com/office/powerpoint/2010/main" val="3828414849"/>
       </p:ext>
     </p:extLst>
   </p:cSld>
@@ -7057,7 +8045,7 @@
 </p:sld>
 </file>
 
-<file path=ppt/slides/slide12.xml><?xml version="1.0" encoding="utf-8"?>
+<file path=ppt/slides/slide14.xml><?xml version="1.0" encoding="utf-8"?>
 <p:sld xmlns:a="http://schemas.openxmlformats.org/drawingml/2006/main" xmlns:r="http://schemas.openxmlformats.org/officeDocument/2006/relationships" xmlns:p="http://schemas.openxmlformats.org/presentationml/2006/main">
   <p:cSld>
     <p:spTree>
@@ -10785,12 +11773,21 @@
 </file>
 
 <file path=customXml/item1.xml><?xml version="1.0" encoding="utf-8"?>
-<?mso-contentType ?>
-<FormTemplates xmlns="http://schemas.microsoft.com/sharepoint/v3/contenttype/forms">
-  <Display>DocumentLibraryForm</Display>
-  <Edit>DocumentLibraryForm</Edit>
-  <New>DocumentLibraryForm</New>
-</FormTemplates>
+<p:properties xmlns:p="http://schemas.microsoft.com/office/2006/metadata/properties" xmlns:xsi="http://www.w3.org/2001/XMLSchema-instance" xmlns:pc="http://schemas.microsoft.com/office/infopath/2007/PartnerControls">
+  <documentManagement>
+    <_ip_UnifiedCompliancePolicyProperties xmlns="http://schemas.microsoft.com/sharepoint/v3" xsi:nil="true"/>
+    <_ip_UnifiedCompliancePolicyUIAction xmlns="http://schemas.microsoft.com/sharepoint/v3" xsi:nil="true"/>
+    <LastSharedByUser xmlns="11245976-3b4d-4794-a754-317688483df2">jogallow@microsoft.com</LastSharedByUser>
+    <SharedWithUsers xmlns="11245976-3b4d-4794-a754-317688483df2">
+      <UserInfo>
+        <DisplayName>Martin Woodward</DisplayName>
+        <AccountId>67</AccountId>
+        <AccountType/>
+      </UserInfo>
+    </SharedWithUsers>
+    <LastSharedByTime xmlns="11245976-3b4d-4794-a754-317688483df2">2018-03-16T04:12:59+00:00</LastSharedByTime>
+  </documentManagement>
+</p:properties>
 </file>
 
 <file path=customXml/item2.xml><?xml version="1.0" encoding="utf-8"?>
@@ -11034,27 +12031,21 @@
 </file>
 
 <file path=customXml/item3.xml><?xml version="1.0" encoding="utf-8"?>
-<p:properties xmlns:p="http://schemas.microsoft.com/office/2006/metadata/properties" xmlns:xsi="http://www.w3.org/2001/XMLSchema-instance" xmlns:pc="http://schemas.microsoft.com/office/infopath/2007/PartnerControls">
-  <documentManagement>
-    <_ip_UnifiedCompliancePolicyProperties xmlns="http://schemas.microsoft.com/sharepoint/v3" xsi:nil="true"/>
-    <_ip_UnifiedCompliancePolicyUIAction xmlns="http://schemas.microsoft.com/sharepoint/v3" xsi:nil="true"/>
-    <LastSharedByUser xmlns="11245976-3b4d-4794-a754-317688483df2">jogallow@microsoft.com</LastSharedByUser>
-    <SharedWithUsers xmlns="11245976-3b4d-4794-a754-317688483df2">
-      <UserInfo>
-        <DisplayName>Martin Woodward</DisplayName>
-        <AccountId>67</AccountId>
-        <AccountType/>
-      </UserInfo>
-    </SharedWithUsers>
-    <LastSharedByTime xmlns="11245976-3b4d-4794-a754-317688483df2">2018-03-16T04:12:59+00:00</LastSharedByTime>
-  </documentManagement>
-</p:properties>
+<?mso-contentType ?>
+<FormTemplates xmlns="http://schemas.microsoft.com/sharepoint/v3/contenttype/forms">
+  <Display>DocumentLibraryForm</Display>
+  <Edit>DocumentLibraryForm</Edit>
+  <New>DocumentLibraryForm</New>
+</FormTemplates>
 </file>
 
 <file path=customXml/itemProps1.xml><?xml version="1.0" encoding="utf-8"?>
-<ds:datastoreItem xmlns:ds="http://schemas.openxmlformats.org/officeDocument/2006/customXml" ds:itemID="{093821A7-5528-48BE-BD00-067FBFDD28D5}">
+<ds:datastoreItem xmlns:ds="http://schemas.openxmlformats.org/officeDocument/2006/customXml" ds:itemID="{D23E43D6-DB2F-4C33-A8C8-D28F777A5DE7}">
   <ds:schemaRefs>
-    <ds:schemaRef ds:uri="http://schemas.microsoft.com/sharepoint/v3/contenttype/forms"/>
+    <ds:schemaRef ds:uri="http://schemas.microsoft.com/office/2006/metadata/properties"/>
+    <ds:schemaRef ds:uri="http://schemas.microsoft.com/office/infopath/2007/PartnerControls"/>
+    <ds:schemaRef ds:uri="http://schemas.microsoft.com/sharepoint/v3"/>
+    <ds:schemaRef ds:uri="11245976-3b4d-4794-a754-317688483df2"/>
   </ds:schemaRefs>
 </ds:datastoreItem>
 </file>
@@ -11080,12 +12071,9 @@
 </file>
 
 <file path=customXml/itemProps3.xml><?xml version="1.0" encoding="utf-8"?>
-<ds:datastoreItem xmlns:ds="http://schemas.openxmlformats.org/officeDocument/2006/customXml" ds:itemID="{D23E43D6-DB2F-4C33-A8C8-D28F777A5DE7}">
+<ds:datastoreItem xmlns:ds="http://schemas.openxmlformats.org/officeDocument/2006/customXml" ds:itemID="{093821A7-5528-48BE-BD00-067FBFDD28D5}">
   <ds:schemaRefs>
-    <ds:schemaRef ds:uri="http://schemas.microsoft.com/office/2006/metadata/properties"/>
-    <ds:schemaRef ds:uri="http://schemas.microsoft.com/office/infopath/2007/PartnerControls"/>
-    <ds:schemaRef ds:uri="http://schemas.microsoft.com/sharepoint/v3"/>
-    <ds:schemaRef ds:uri="11245976-3b4d-4794-a754-317688483df2"/>
+    <ds:schemaRef ds:uri="http://schemas.microsoft.com/sharepoint/v3/contenttype/forms"/>
   </ds:schemaRefs>
 </ds:datastoreItem>
 </file>
</xml_diff>